<commit_message>
New image for wiki page
</commit_message>
<xml_diff>
--- a/resources/wiki/Book-Images.pptx
+++ b/resources/wiki/Book-Images.pptx
@@ -243,7 +243,7 @@
           <a:p>
             <a:fld id="{78F2F26C-9256-4E49-822A-CBF31DCDB915}" type="datetimeFigureOut">
               <a:rPr lang="en-US" smtClean="0"/>
-              <a:t>3/7/2017</a:t>
+              <a:t>11/21/2018</a:t>
             </a:fld>
             <a:endParaRPr lang="en-US"/>
           </a:p>
@@ -411,7 +411,7 @@
           <a:p>
             <a:fld id="{78F2F26C-9256-4E49-822A-CBF31DCDB915}" type="datetimeFigureOut">
               <a:rPr lang="en-US" smtClean="0"/>
-              <a:t>3/7/2017</a:t>
+              <a:t>11/21/2018</a:t>
             </a:fld>
             <a:endParaRPr lang="en-US"/>
           </a:p>
@@ -589,7 +589,7 @@
           <a:p>
             <a:fld id="{78F2F26C-9256-4E49-822A-CBF31DCDB915}" type="datetimeFigureOut">
               <a:rPr lang="en-US" smtClean="0"/>
-              <a:t>3/7/2017</a:t>
+              <a:t>11/21/2018</a:t>
             </a:fld>
             <a:endParaRPr lang="en-US"/>
           </a:p>
@@ -757,7 +757,7 @@
           <a:p>
             <a:fld id="{78F2F26C-9256-4E49-822A-CBF31DCDB915}" type="datetimeFigureOut">
               <a:rPr lang="en-US" smtClean="0"/>
-              <a:t>3/7/2017</a:t>
+              <a:t>11/21/2018</a:t>
             </a:fld>
             <a:endParaRPr lang="en-US"/>
           </a:p>
@@ -1002,7 +1002,7 @@
           <a:p>
             <a:fld id="{78F2F26C-9256-4E49-822A-CBF31DCDB915}" type="datetimeFigureOut">
               <a:rPr lang="en-US" smtClean="0"/>
-              <a:t>3/7/2017</a:t>
+              <a:t>11/21/2018</a:t>
             </a:fld>
             <a:endParaRPr lang="en-US"/>
           </a:p>
@@ -1231,7 +1231,7 @@
           <a:p>
             <a:fld id="{78F2F26C-9256-4E49-822A-CBF31DCDB915}" type="datetimeFigureOut">
               <a:rPr lang="en-US" smtClean="0"/>
-              <a:t>3/7/2017</a:t>
+              <a:t>11/21/2018</a:t>
             </a:fld>
             <a:endParaRPr lang="en-US"/>
           </a:p>
@@ -1595,7 +1595,7 @@
           <a:p>
             <a:fld id="{78F2F26C-9256-4E49-822A-CBF31DCDB915}" type="datetimeFigureOut">
               <a:rPr lang="en-US" smtClean="0"/>
-              <a:t>3/7/2017</a:t>
+              <a:t>11/21/2018</a:t>
             </a:fld>
             <a:endParaRPr lang="en-US"/>
           </a:p>
@@ -1712,7 +1712,7 @@
           <a:p>
             <a:fld id="{78F2F26C-9256-4E49-822A-CBF31DCDB915}" type="datetimeFigureOut">
               <a:rPr lang="en-US" smtClean="0"/>
-              <a:t>3/7/2017</a:t>
+              <a:t>11/21/2018</a:t>
             </a:fld>
             <a:endParaRPr lang="en-US"/>
           </a:p>
@@ -1807,7 +1807,7 @@
           <a:p>
             <a:fld id="{78F2F26C-9256-4E49-822A-CBF31DCDB915}" type="datetimeFigureOut">
               <a:rPr lang="en-US" smtClean="0"/>
-              <a:t>3/7/2017</a:t>
+              <a:t>11/21/2018</a:t>
             </a:fld>
             <a:endParaRPr lang="en-US"/>
           </a:p>
@@ -2082,7 +2082,7 @@
           <a:p>
             <a:fld id="{78F2F26C-9256-4E49-822A-CBF31DCDB915}" type="datetimeFigureOut">
               <a:rPr lang="en-US" smtClean="0"/>
-              <a:t>3/7/2017</a:t>
+              <a:t>11/21/2018</a:t>
             </a:fld>
             <a:endParaRPr lang="en-US"/>
           </a:p>
@@ -2334,7 +2334,7 @@
           <a:p>
             <a:fld id="{78F2F26C-9256-4E49-822A-CBF31DCDB915}" type="datetimeFigureOut">
               <a:rPr lang="en-US" smtClean="0"/>
-              <a:t>3/7/2017</a:t>
+              <a:t>11/21/2018</a:t>
             </a:fld>
             <a:endParaRPr lang="en-US"/>
           </a:p>
@@ -2545,7 +2545,7 @@
           <a:p>
             <a:fld id="{78F2F26C-9256-4E49-822A-CBF31DCDB915}" type="datetimeFigureOut">
               <a:rPr lang="en-US" smtClean="0"/>
-              <a:t>3/7/2017</a:t>
+              <a:t>11/21/2018</a:t>
             </a:fld>
             <a:endParaRPr lang="en-US"/>
           </a:p>
@@ -4249,6 +4249,19 @@
               <a:buSzPct val="70000"/>
             </a:pPr>
             <a:r>
+              <a:rPr lang="en-US" sz="2800" b="1" noProof="1" smtClean="0">
+                <a:effectLst>
+                  <a:outerShdw blurRad="38100" dist="38100" dir="2700000" algn="tl">
+                    <a:schemeClr val="bg1">
+                      <a:alpha val="43000"/>
+                    </a:schemeClr>
+                  </a:outerShdw>
+                </a:effectLst>
+                <a:latin typeface="Consolas" pitchFamily="49" charset="0"/>
+              </a:rPr>
+              <a:t>int </a:t>
+            </a:r>
+            <a:r>
               <a:rPr lang="en-US" sz="2800" b="1" noProof="1">
                 <a:effectLst>
                   <a:outerShdw blurRad="38100" dist="38100" dir="2700000" algn="tl">
@@ -4259,7 +4272,7 @@
                 </a:effectLst>
                 <a:latin typeface="Consolas" pitchFamily="49" charset="0"/>
               </a:rPr>
-              <a:t>var count = 5;</a:t>
+              <a:t>count = 5;</a:t>
             </a:r>
           </a:p>
         </p:txBody>
@@ -4274,13 +4287,13 @@
         </p:nvSpPr>
         <p:spPr bwMode="auto">
           <a:xfrm>
-            <a:off x="979054" y="4696499"/>
-            <a:ext cx="2155657" cy="669828"/>
+            <a:off x="1152894" y="3837820"/>
+            <a:ext cx="2872143" cy="837781"/>
           </a:xfrm>
           <a:prstGeom prst="wedgeRoundRectCallout">
             <a:avLst>
-              <a:gd name="adj1" fmla="val 72797"/>
-              <a:gd name="adj2" fmla="val 31163"/>
+              <a:gd name="adj1" fmla="val 38534"/>
+              <a:gd name="adj2" fmla="val 97690"/>
               <a:gd name="adj3" fmla="val 16667"/>
             </a:avLst>
           </a:prstGeom>
@@ -4332,14 +4345,41 @@
                 </a:solidFill>
                 <a:effectLst>
                   <a:outerShdw blurRad="38100" dist="38100" dir="2700000" algn="tl">
-                    <a:schemeClr val="bg1">
-                      <a:alpha val="43000"/>
-                    </a:schemeClr>
+                    <a:srgbClr val="000000">
+                      <a:alpha val="43137"/>
+                    </a:srgbClr>
                   </a:outerShdw>
                 </a:effectLst>
               </a:rPr>
-              <a:t>Декларация</a:t>
-            </a:r>
+              <a:t>Тип данни на </a:t>
+            </a:r>
+            <a:r>
+              <a:rPr lang="bg-BG" sz="2800" b="1" dirty="0" smtClean="0">
+                <a:solidFill>
+                  <a:schemeClr val="tx1"/>
+                </a:solidFill>
+                <a:effectLst>
+                  <a:outerShdw blurRad="38100" dist="38100" dir="2700000" algn="tl">
+                    <a:srgbClr val="000000">
+                      <a:alpha val="43137"/>
+                    </a:srgbClr>
+                  </a:outerShdw>
+                </a:effectLst>
+              </a:rPr>
+              <a:t>променливата</a:t>
+            </a:r>
+            <a:endParaRPr lang="bg-BG" sz="2800" b="1" dirty="0">
+              <a:solidFill>
+                <a:schemeClr val="tx1"/>
+              </a:solidFill>
+              <a:effectLst>
+                <a:outerShdw blurRad="38100" dist="38100" dir="2700000" algn="tl">
+                  <a:srgbClr val="000000">
+                    <a:alpha val="43137"/>
+                  </a:srgbClr>
+                </a:outerShdw>
+              </a:effectLst>
+            </a:endParaRPr>
           </a:p>
         </p:txBody>
       </p:sp>

</xml_diff>